<commit_message>
Ajout du rapport et de la présentation mise a jour
</commit_message>
<xml_diff>
--- a/Projet 3 - recomm. de films/Presentation-projet_3.pptx
+++ b/Projet 3 - recomm. de films/Presentation-projet_3.pptx
@@ -209,7 +209,7 @@
           <a:p>
             <a:fld id="{E66492E5-39EF-4EC5-9E99-7F0DBC26806B}" type="datetimeFigureOut">
               <a:rPr lang="fr-FR" smtClean="0"/>
-              <a:t>18/11/2017</a:t>
+              <a:t>19/11/2017</a:t>
             </a:fld>
             <a:endParaRPr lang="fr-FR"/>
           </a:p>
@@ -742,7 +742,7 @@
           <a:p>
             <a:fld id="{2A35F02A-33DF-42A4-9F54-2DFA5B84052E}" type="datetime1">
               <a:rPr lang="fr-FR" smtClean="0"/>
-              <a:t>18/11/2017</a:t>
+              <a:t>19/11/2017</a:t>
             </a:fld>
             <a:endParaRPr lang="fr-FR"/>
           </a:p>
@@ -916,7 +916,7 @@
           <a:p>
             <a:fld id="{AA7084F6-C923-4306-BC74-6AA1A26D5992}" type="datetime1">
               <a:rPr lang="fr-FR" smtClean="0"/>
-              <a:t>18/11/2017</a:t>
+              <a:t>19/11/2017</a:t>
             </a:fld>
             <a:endParaRPr lang="fr-FR"/>
           </a:p>
@@ -1100,7 +1100,7 @@
           <a:p>
             <a:fld id="{6B9DA1C8-56AA-40E0-92DC-CCF13B41CFF7}" type="datetime1">
               <a:rPr lang="fr-FR" smtClean="0"/>
-              <a:t>18/11/2017</a:t>
+              <a:t>19/11/2017</a:t>
             </a:fld>
             <a:endParaRPr lang="fr-FR"/>
           </a:p>
@@ -1274,7 +1274,7 @@
           <a:p>
             <a:fld id="{30547005-2CCE-4AAF-810C-C33FB4661996}" type="datetime1">
               <a:rPr lang="fr-FR" smtClean="0"/>
-              <a:t>18/11/2017</a:t>
+              <a:t>19/11/2017</a:t>
             </a:fld>
             <a:endParaRPr lang="fr-FR"/>
           </a:p>
@@ -1524,7 +1524,7 @@
           <a:p>
             <a:fld id="{3EBD0647-CE4F-4B82-BC14-997434234D2E}" type="datetime1">
               <a:rPr lang="fr-FR" smtClean="0"/>
-              <a:t>18/11/2017</a:t>
+              <a:t>19/11/2017</a:t>
             </a:fld>
             <a:endParaRPr lang="fr-FR"/>
           </a:p>
@@ -1816,7 +1816,7 @@
           <a:p>
             <a:fld id="{263CA1C6-1D15-44B1-8495-DE2EC5425D2F}" type="datetime1">
               <a:rPr lang="fr-FR" smtClean="0"/>
-              <a:t>18/11/2017</a:t>
+              <a:t>19/11/2017</a:t>
             </a:fld>
             <a:endParaRPr lang="fr-FR"/>
           </a:p>
@@ -2242,7 +2242,7 @@
           <a:p>
             <a:fld id="{5F86B07A-1301-4558-A6E0-D7A436826ECB}" type="datetime1">
               <a:rPr lang="fr-FR" smtClean="0"/>
-              <a:t>18/11/2017</a:t>
+              <a:t>19/11/2017</a:t>
             </a:fld>
             <a:endParaRPr lang="fr-FR"/>
           </a:p>
@@ -2364,7 +2364,7 @@
           <a:p>
             <a:fld id="{10CD6315-9A1E-41E9-BC28-33D394163B67}" type="datetime1">
               <a:rPr lang="fr-FR" smtClean="0"/>
-              <a:t>18/11/2017</a:t>
+              <a:t>19/11/2017</a:t>
             </a:fld>
             <a:endParaRPr lang="fr-FR"/>
           </a:p>
@@ -2463,7 +2463,7 @@
           <a:p>
             <a:fld id="{8EA7A85C-1960-4CA0-B72B-A39E81C20158}" type="datetime1">
               <a:rPr lang="fr-FR" smtClean="0"/>
-              <a:t>18/11/2017</a:t>
+              <a:t>19/11/2017</a:t>
             </a:fld>
             <a:endParaRPr lang="fr-FR"/>
           </a:p>
@@ -2744,7 +2744,7 @@
           <a:p>
             <a:fld id="{885A14C0-C539-4FC5-A6ED-ABABD975303B}" type="datetime1">
               <a:rPr lang="fr-FR" smtClean="0"/>
-              <a:t>18/11/2017</a:t>
+              <a:t>19/11/2017</a:t>
             </a:fld>
             <a:endParaRPr lang="fr-FR"/>
           </a:p>
@@ -3001,7 +3001,7 @@
           <a:p>
             <a:fld id="{D772F3C9-8121-4DF6-9420-FBC4A08EF57A}" type="datetime1">
               <a:rPr lang="fr-FR" smtClean="0"/>
-              <a:t>18/11/2017</a:t>
+              <a:t>19/11/2017</a:t>
             </a:fld>
             <a:endParaRPr lang="fr-FR"/>
           </a:p>
@@ -3239,7 +3239,7 @@
           <a:p>
             <a:fld id="{C13329EF-B01B-4D4B-83A1-AFBB7696C373}" type="datetime1">
               <a:rPr lang="fr-FR" smtClean="0"/>
-              <a:t>18/11/2017</a:t>
+              <a:t>19/11/2017</a:t>
             </a:fld>
             <a:endParaRPr lang="fr-FR"/>
           </a:p>
@@ -3729,7 +3729,7 @@
                   <a:srgbClr val="95023C"/>
                 </a:solidFill>
               </a:rPr>
-              <a:t>18/11/2017</a:t>
+              <a:t>19/11/2017</a:t>
             </a:fld>
             <a:endParaRPr lang="fr-FR" dirty="0">
               <a:solidFill>
@@ -5203,7 +5203,7 @@
         </p:nvSpPr>
         <p:spPr>
           <a:xfrm>
-            <a:off x="539552" y="4216439"/>
+            <a:off x="532643" y="4237409"/>
             <a:ext cx="4248472" cy="2092881"/>
           </a:xfrm>
           <a:prstGeom prst="rect">
@@ -6649,11 +6649,6 @@
               </a:rPr>
               <a:t>Récupération des n-pts les plus proche</a:t>
             </a:r>
-            <a:endParaRPr lang="fr-FR" dirty="0" smtClean="0">
-              <a:solidFill>
-                <a:srgbClr val="E8750C"/>
-              </a:solidFill>
-            </a:endParaRPr>
           </a:p>
         </p:txBody>
       </p:sp>
@@ -7707,11 +7702,6 @@
               </a:rPr>
               <a:t>TSNE</a:t>
             </a:r>
-            <a:endParaRPr lang="fr-FR" dirty="0" smtClean="0">
-              <a:solidFill>
-                <a:srgbClr val="E8750C"/>
-              </a:solidFill>
-            </a:endParaRPr>
           </a:p>
           <a:p>
             <a:pPr lvl="1">
@@ -8212,7 +8202,7 @@
           <a:p>
             <a:fld id="{30547005-2CCE-4AAF-810C-C33FB4661996}" type="datetime1">
               <a:rPr lang="fr-FR" smtClean="0"/>
-              <a:t>18/11/2017</a:t>
+              <a:t>19/11/2017</a:t>
             </a:fld>
             <a:endParaRPr lang="fr-FR"/>
           </a:p>
@@ -8327,7 +8317,7 @@
               <a:buChar char="Ø"/>
             </a:pPr>
             <a:r>
-              <a:rPr lang="fr-FR" dirty="0" smtClean="0">
+              <a:rPr lang="fr-FR" sz="2800" dirty="0" smtClean="0">
                 <a:solidFill>
                   <a:srgbClr val="E8750C"/>
                 </a:solidFill>
@@ -8341,7 +8331,7 @@
               <a:buChar char="Ø"/>
             </a:pPr>
             <a:r>
-              <a:rPr lang="fr-FR" dirty="0" err="1" smtClean="0">
+              <a:rPr lang="fr-FR" sz="2400" dirty="0" err="1" smtClean="0">
                 <a:solidFill>
                   <a:srgbClr val="E8750C"/>
                 </a:solidFill>
@@ -8349,7 +8339,7 @@
               <a:t>Color</a:t>
             </a:r>
             <a:r>
-              <a:rPr lang="fr-FR" dirty="0" smtClean="0">
+              <a:rPr lang="fr-FR" sz="2400" dirty="0" smtClean="0">
                 <a:solidFill>
                   <a:srgbClr val="E8750C"/>
                 </a:solidFill>
@@ -8363,7 +8353,7 @@
               <a:buChar char="Ø"/>
             </a:pPr>
             <a:r>
-              <a:rPr lang="fr-FR" dirty="0" err="1" smtClean="0">
+              <a:rPr lang="fr-FR" sz="2400" dirty="0" err="1" smtClean="0">
                 <a:solidFill>
                   <a:srgbClr val="E8750C"/>
                 </a:solidFill>
@@ -8371,7 +8361,7 @@
               <a:t>Critic</a:t>
             </a:r>
             <a:r>
-              <a:rPr lang="fr-FR" dirty="0" smtClean="0">
+              <a:rPr lang="fr-FR" sz="2400" dirty="0" smtClean="0">
                 <a:solidFill>
                   <a:srgbClr val="E8750C"/>
                 </a:solidFill>
@@ -8379,7 +8369,7 @@
               <a:t>/</a:t>
             </a:r>
             <a:r>
-              <a:rPr lang="fr-FR" dirty="0" err="1" smtClean="0">
+              <a:rPr lang="fr-FR" sz="2400" dirty="0" err="1" smtClean="0">
                 <a:solidFill>
                   <a:srgbClr val="E8750C"/>
                 </a:solidFill>
@@ -8387,7 +8377,7 @@
               <a:t>likes</a:t>
             </a:r>
             <a:r>
-              <a:rPr lang="fr-FR" dirty="0">
+              <a:rPr lang="fr-FR" sz="2400" dirty="0">
                 <a:solidFill>
                   <a:srgbClr val="E8750C"/>
                 </a:solidFill>
@@ -8395,7 +8385,7 @@
               <a:t>/"compte": </a:t>
             </a:r>
             <a:r>
-              <a:rPr lang="fr-FR" dirty="0" smtClean="0">
+              <a:rPr lang="fr-FR" sz="2400" dirty="0" smtClean="0">
                 <a:solidFill>
                   <a:srgbClr val="E8750C"/>
                 </a:solidFill>
@@ -8409,7 +8399,7 @@
               <a:buChar char="Ø"/>
             </a:pPr>
             <a:r>
-              <a:rPr lang="fr-FR" dirty="0" smtClean="0">
+              <a:rPr lang="fr-FR" sz="2400" dirty="0" smtClean="0">
                 <a:solidFill>
                   <a:srgbClr val="E8750C"/>
                 </a:solidFill>
@@ -8417,7 +8407,7 @@
               <a:t>Durée/vente/budget/</a:t>
             </a:r>
             <a:r>
-              <a:rPr lang="fr-FR" dirty="0" err="1" smtClean="0">
+              <a:rPr lang="fr-FR" sz="2400" dirty="0" err="1" smtClean="0">
                 <a:solidFill>
                   <a:srgbClr val="E8750C"/>
                 </a:solidFill>
@@ -8425,7 +8415,7 @@
               <a:t>year</a:t>
             </a:r>
             <a:r>
-              <a:rPr lang="fr-FR" dirty="0" smtClean="0">
+              <a:rPr lang="fr-FR" sz="2400" dirty="0" smtClean="0">
                 <a:solidFill>
                   <a:srgbClr val="E8750C"/>
                 </a:solidFill>
@@ -8439,7 +8429,7 @@
               <a:buChar char="Ø"/>
             </a:pPr>
             <a:r>
-              <a:rPr lang="fr-FR" dirty="0" smtClean="0">
+              <a:rPr lang="fr-FR" sz="2400" dirty="0" smtClean="0">
                 <a:solidFill>
                   <a:srgbClr val="E8750C"/>
                 </a:solidFill>
@@ -8453,7 +8443,7 @@
               <a:buChar char="Ø"/>
             </a:pPr>
             <a:r>
-              <a:rPr lang="fr-FR" dirty="0" smtClean="0">
+              <a:rPr lang="fr-FR" sz="2400" dirty="0" smtClean="0">
                 <a:solidFill>
                   <a:srgbClr val="E8750C"/>
                 </a:solidFill>
@@ -8491,7 +8481,7 @@
           <a:p>
             <a:fld id="{30547005-2CCE-4AAF-810C-C33FB4661996}" type="datetime1">
               <a:rPr lang="fr-FR" smtClean="0"/>
-              <a:t>18/11/2017</a:t>
+              <a:t>19/11/2017</a:t>
             </a:fld>
             <a:endParaRPr lang="fr-FR"/>
           </a:p>
@@ -8522,14 +8512,14 @@
       </p:sp>
       <p:pic>
         <p:nvPicPr>
-          <p:cNvPr id="5122" name="Picture 2" descr="F:\Nicolas\Documents\OpenClassRoom\Projet 3 - recomm. de films\country.png"/>
+          <p:cNvPr id="1026" name="Picture 2" descr="F:\Nicolas\Documents\OpenClassRoom\Projet 3 - recomm. de films\color.png"/>
           <p:cNvPicPr>
             <a:picLocks noChangeAspect="1" noChangeArrowheads="1"/>
           </p:cNvPicPr>
           <p:nvPr/>
         </p:nvPicPr>
         <p:blipFill>
-          <a:blip r:embed="rId2">
+          <a:blip r:embed="rId2" cstate="print">
             <a:clrChange>
               <a:clrFrom>
                 <a:srgbClr val="FFFFFF"/>
@@ -8553,8 +8543,110 @@
         </p:blipFill>
         <p:spPr bwMode="auto">
           <a:xfrm>
-            <a:off x="4761012" y="4077072"/>
-            <a:ext cx="4353644" cy="2902849"/>
+            <a:off x="603373" y="4422710"/>
+            <a:ext cx="3392563" cy="2035538"/>
+          </a:xfrm>
+          <a:prstGeom prst="rect">
+            <a:avLst/>
+          </a:prstGeom>
+          <a:noFill/>
+          <a:extLst>
+            <a:ext uri="{909E8E84-426E-40DD-AFC4-6F175D3DCCD1}">
+              <a14:hiddenFill xmlns:a14="http://schemas.microsoft.com/office/drawing/2010/main">
+                <a:solidFill>
+                  <a:srgbClr val="FFFFFF"/>
+                </a:solidFill>
+              </a14:hiddenFill>
+            </a:ext>
+          </a:extLst>
+        </p:spPr>
+      </p:pic>
+      <p:pic>
+        <p:nvPicPr>
+          <p:cNvPr id="1027" name="Picture 3" descr="F:\Nicolas\Documents\OpenClassRoom\Projet 3 - recomm. de films\language.png"/>
+          <p:cNvPicPr>
+            <a:picLocks noChangeAspect="1" noChangeArrowheads="1"/>
+          </p:cNvPicPr>
+          <p:nvPr/>
+        </p:nvPicPr>
+        <p:blipFill>
+          <a:blip r:embed="rId3">
+            <a:clrChange>
+              <a:clrFrom>
+                <a:srgbClr val="FFFFFF"/>
+              </a:clrFrom>
+              <a:clrTo>
+                <a:srgbClr val="FFFFFF">
+                  <a:alpha val="0"/>
+                </a:srgbClr>
+              </a:clrTo>
+            </a:clrChange>
+            <a:extLst>
+              <a:ext uri="{28A0092B-C50C-407E-A947-70E740481C1C}">
+                <a14:useLocalDpi xmlns:a14="http://schemas.microsoft.com/office/drawing/2010/main" val="0"/>
+              </a:ext>
+            </a:extLst>
+          </a:blip>
+          <a:srcRect/>
+          <a:stretch>
+            <a:fillRect/>
+          </a:stretch>
+        </p:blipFill>
+        <p:spPr bwMode="auto">
+          <a:xfrm>
+            <a:off x="3690058" y="4576627"/>
+            <a:ext cx="2706663" cy="1804702"/>
+          </a:xfrm>
+          <a:prstGeom prst="rect">
+            <a:avLst/>
+          </a:prstGeom>
+          <a:noFill/>
+          <a:extLst>
+            <a:ext uri="{909E8E84-426E-40DD-AFC4-6F175D3DCCD1}">
+              <a14:hiddenFill xmlns:a14="http://schemas.microsoft.com/office/drawing/2010/main">
+                <a:solidFill>
+                  <a:srgbClr val="FFFFFF"/>
+                </a:solidFill>
+              </a14:hiddenFill>
+            </a:ext>
+          </a:extLst>
+        </p:spPr>
+      </p:pic>
+      <p:pic>
+        <p:nvPicPr>
+          <p:cNvPr id="1028" name="Picture 4" descr="F:\Nicolas\Documents\OpenClassRoom\Projet 3 - recomm. de films\country.png"/>
+          <p:cNvPicPr>
+            <a:picLocks noChangeAspect="1" noChangeArrowheads="1"/>
+          </p:cNvPicPr>
+          <p:nvPr/>
+        </p:nvPicPr>
+        <p:blipFill>
+          <a:blip r:embed="rId4">
+            <a:clrChange>
+              <a:clrFrom>
+                <a:srgbClr val="FFFFFF"/>
+              </a:clrFrom>
+              <a:clrTo>
+                <a:srgbClr val="FFFFFF">
+                  <a:alpha val="0"/>
+                </a:srgbClr>
+              </a:clrTo>
+            </a:clrChange>
+            <a:extLst>
+              <a:ext uri="{28A0092B-C50C-407E-A947-70E740481C1C}">
+                <a14:useLocalDpi xmlns:a14="http://schemas.microsoft.com/office/drawing/2010/main" val="0"/>
+              </a:ext>
+            </a:extLst>
+          </a:blip>
+          <a:srcRect/>
+          <a:stretch>
+            <a:fillRect/>
+          </a:stretch>
+        </p:blipFill>
+        <p:spPr bwMode="auto">
+          <a:xfrm>
+            <a:off x="6329834" y="4576627"/>
+            <a:ext cx="2706662" cy="1804701"/>
           </a:xfrm>
           <a:prstGeom prst="rect">
             <a:avLst/>
@@ -8662,7 +8754,23 @@
                   <a:srgbClr val="E8750C"/>
                 </a:solidFill>
               </a:rPr>
-              <a:t>Phase 1 : Simplification</a:t>
+              <a:t>Phase </a:t>
+            </a:r>
+            <a:r>
+              <a:rPr lang="fr-FR" dirty="0" smtClean="0">
+                <a:solidFill>
+                  <a:srgbClr val="E8750C"/>
+                </a:solidFill>
+              </a:rPr>
+              <a:t>2 </a:t>
+            </a:r>
+            <a:r>
+              <a:rPr lang="fr-FR" dirty="0" smtClean="0">
+                <a:solidFill>
+                  <a:srgbClr val="E8750C"/>
+                </a:solidFill>
+              </a:rPr>
+              <a:t>: Simplification</a:t>
             </a:r>
           </a:p>
           <a:p>
@@ -8781,7 +8889,7 @@
           <a:p>
             <a:fld id="{30547005-2CCE-4AAF-810C-C33FB4661996}" type="datetime1">
               <a:rPr lang="fr-FR" smtClean="0"/>
-              <a:t>18/11/2017</a:t>
+              <a:t>19/11/2017</a:t>
             </a:fld>
             <a:endParaRPr lang="fr-FR"/>
           </a:p>
@@ -8989,7 +9097,7 @@
         <p:spPr/>
         <p:txBody>
           <a:bodyPr>
-            <a:normAutofit/>
+            <a:normAutofit fontScale="92500"/>
           </a:bodyPr>
           <a:lstStyle/>
           <a:p>
@@ -9003,7 +9111,23 @@
                   <a:srgbClr val="E8750C"/>
                 </a:solidFill>
               </a:rPr>
-              <a:t>Phase 2.1 : Suppression </a:t>
+              <a:t>Phase </a:t>
+            </a:r>
+            <a:r>
+              <a:rPr lang="fr-FR" dirty="0" smtClean="0">
+                <a:solidFill>
+                  <a:srgbClr val="E8750C"/>
+                </a:solidFill>
+              </a:rPr>
+              <a:t>3.1 </a:t>
+            </a:r>
+            <a:r>
+              <a:rPr lang="fr-FR" dirty="0" smtClean="0">
+                <a:solidFill>
+                  <a:srgbClr val="E8750C"/>
+                </a:solidFill>
+              </a:rPr>
+              <a:t>: Suppression </a:t>
             </a:r>
             <a:r>
               <a:rPr lang="fr-FR" dirty="0" err="1" smtClean="0">
@@ -9089,6 +9213,68 @@
             </a:endParaRPr>
           </a:p>
           <a:p>
+            <a:pPr lvl="1">
+              <a:buFont typeface="Wingdings" pitchFamily="2" charset="2"/>
+              <a:buChar char="Ø"/>
+            </a:pPr>
+            <a:r>
+              <a:rPr lang="fr-FR" dirty="0" smtClean="0">
+                <a:solidFill>
+                  <a:srgbClr val="E8750C"/>
+                </a:solidFill>
+              </a:rPr>
+              <a:t>Après test (</a:t>
+            </a:r>
+            <a:r>
+              <a:rPr lang="fr-FR" dirty="0" err="1" smtClean="0">
+                <a:solidFill>
+                  <a:srgbClr val="E8750C"/>
+                </a:solidFill>
+              </a:rPr>
+              <a:t>color</a:t>
+            </a:r>
+            <a:r>
+              <a:rPr lang="fr-FR" dirty="0" smtClean="0">
+                <a:solidFill>
+                  <a:srgbClr val="E8750C"/>
+                </a:solidFill>
+              </a:rPr>
+              <a:t>, </a:t>
+            </a:r>
+            <a:r>
+              <a:rPr lang="fr-FR" dirty="0" err="1" smtClean="0">
+                <a:solidFill>
+                  <a:srgbClr val="E8750C"/>
+                </a:solidFill>
+              </a:rPr>
+              <a:t>num_critic</a:t>
+            </a:r>
+            <a:r>
+              <a:rPr lang="fr-FR" dirty="0" smtClean="0">
+                <a:solidFill>
+                  <a:srgbClr val="E8750C"/>
+                </a:solidFill>
+              </a:rPr>
+              <a:t>, </a:t>
+            </a:r>
+            <a:r>
+              <a:rPr lang="fr-FR" dirty="0" err="1" smtClean="0">
+                <a:solidFill>
+                  <a:srgbClr val="E8750C"/>
+                </a:solidFill>
+              </a:rPr>
+              <a:t>num_user</a:t>
+            </a:r>
+            <a:r>
+              <a:rPr lang="fr-FR" dirty="0" smtClean="0">
+                <a:solidFill>
+                  <a:srgbClr val="E8750C"/>
+                </a:solidFill>
+              </a:rPr>
+              <a:t>, budget, …)</a:t>
+            </a:r>
+          </a:p>
+          <a:p>
             <a:pPr>
               <a:buFont typeface="Wingdings" pitchFamily="2" charset="2"/>
               <a:buChar char="Ø"/>
@@ -9107,7 +9293,15 @@
                   <a:srgbClr val="E8750C"/>
                 </a:solidFill>
               </a:rPr>
-              <a:t>2.2 : Suppression Films</a:t>
+              <a:t>3.2 </a:t>
+            </a:r>
+            <a:r>
+              <a:rPr lang="fr-FR" dirty="0" smtClean="0">
+                <a:solidFill>
+                  <a:srgbClr val="E8750C"/>
+                </a:solidFill>
+              </a:rPr>
+              <a:t>: Suppression Films</a:t>
             </a:r>
           </a:p>
           <a:p>
@@ -9202,7 +9396,7 @@
           <a:p>
             <a:fld id="{30547005-2CCE-4AAF-810C-C33FB4661996}" type="datetime1">
               <a:rPr lang="fr-FR" smtClean="0"/>
-              <a:t>18/11/2017</a:t>
+              <a:t>19/11/2017</a:t>
             </a:fld>
             <a:endParaRPr lang="fr-FR"/>
           </a:p>
@@ -9373,7 +9567,23 @@
                   <a:srgbClr val="E8750C"/>
                 </a:solidFill>
               </a:rPr>
-              <a:t>Phase 3 : Encodage/Clean</a:t>
+              <a:t>Phase </a:t>
+            </a:r>
+            <a:r>
+              <a:rPr lang="fr-FR" dirty="0" smtClean="0">
+                <a:solidFill>
+                  <a:srgbClr val="E8750C"/>
+                </a:solidFill>
+              </a:rPr>
+              <a:t>4 </a:t>
+            </a:r>
+            <a:r>
+              <a:rPr lang="fr-FR" dirty="0" smtClean="0">
+                <a:solidFill>
+                  <a:srgbClr val="E8750C"/>
+                </a:solidFill>
+              </a:rPr>
+              <a:t>: Encodage/Clean</a:t>
             </a:r>
           </a:p>
           <a:p>
@@ -9510,7 +9720,7 @@
           <a:p>
             <a:fld id="{30547005-2CCE-4AAF-810C-C33FB4661996}" type="datetime1">
               <a:rPr lang="fr-FR" smtClean="0"/>
-              <a:t>18/11/2017</a:t>
+              <a:t>19/11/2017</a:t>
             </a:fld>
             <a:endParaRPr lang="fr-FR"/>
           </a:p>
@@ -9703,11 +9913,6 @@
               </a:rPr>
               <a:t>A fournir</a:t>
             </a:r>
-            <a:endParaRPr lang="fr-FR" sz="2000" dirty="0" smtClean="0">
-              <a:solidFill>
-                <a:srgbClr val="E8750C"/>
-              </a:solidFill>
-            </a:endParaRPr>
           </a:p>
           <a:p>
             <a:pPr lvl="1">
@@ -9736,11 +9941,6 @@
               </a:rPr>
               <a:t>Recommander possible</a:t>
             </a:r>
-            <a:endParaRPr lang="fr-FR" sz="2000" dirty="0" smtClean="0">
-              <a:solidFill>
-                <a:srgbClr val="E8750C"/>
-              </a:solidFill>
-            </a:endParaRPr>
           </a:p>
           <a:p>
             <a:pPr lvl="1">

</xml_diff>